<commit_message>
Fixed issue for word_guesser returning 0 Edited poster Made PCA dimension graph logarithmically spaced
</commit_message>
<xml_diff>
--- a/posterFMRI.pptx
+++ b/posterFMRI.pptx
@@ -139,7 +139,7 @@
   </p:defaultTextStyle>
   <p:extLst>
     <p:ext uri="{EFAFB233-063F-42B5-8137-9DF3F51BA10A}">
-      <p15:sldGuideLst xmlns:p15="http://schemas.microsoft.com/office/powerpoint/2012/main" xmlns="">
+      <p15:sldGuideLst xmlns:p15="http://schemas.microsoft.com/office/powerpoint/2012/main">
         <p15:guide id="1" orient="horz" pos="9216" userDrawn="1">
           <p15:clr>
             <a:srgbClr val="A4A3A4"/>
@@ -153,7 +153,7 @@
       </p15:sldGuideLst>
     </p:ext>
     <p:ext uri="{2D200454-40CA-4A62-9FC3-DE9A4176ACB9}">
-      <p15:notesGuideLst xmlns:p15="http://schemas.microsoft.com/office/powerpoint/2012/main" xmlns=""/>
+      <p15:notesGuideLst xmlns:p15="http://schemas.microsoft.com/office/powerpoint/2012/main"/>
     </p:ext>
   </p:extLst>
 </p:presentation>
@@ -253,7 +253,7 @@
             <a:fld id="{B4862F1A-3685-B948-98E7-08823BA71FE2}" type="datetime1">
               <a:rPr lang="el-GR"/>
               <a:pPr/>
-              <a:t>12/6/15</a:t>
+              <a:t>6/12/2015</a:t>
             </a:fld>
             <a:endParaRPr lang="el-GR"/>
           </a:p>
@@ -771,7 +771,7 @@
             <a:fld id="{2E6CE7CD-F68D-CB4F-B04D-F08E5924DCF3}" type="datetime1">
               <a:rPr lang="en-US" smtClean="0"/>
               <a:pPr/>
-              <a:t>12/6/15</a:t>
+              <a:t>12/6/2015</a:t>
             </a:fld>
             <a:endParaRPr lang="en-US" dirty="0"/>
           </a:p>
@@ -1229,7 +1229,7 @@
             <a:fld id="{2E6CE7CD-F68D-CB4F-B04D-F08E5924DCF3}" type="datetime1">
               <a:rPr lang="en-US" smtClean="0"/>
               <a:pPr/>
-              <a:t>12/6/15</a:t>
+              <a:t>12/6/2015</a:t>
             </a:fld>
             <a:endParaRPr lang="en-US" dirty="0"/>
           </a:p>
@@ -1777,7 +1777,7 @@
             <a:fld id="{2E6CE7CD-F68D-CB4F-B04D-F08E5924DCF3}" type="datetime1">
               <a:rPr lang="en-US" smtClean="0"/>
               <a:pPr/>
-              <a:t>12/6/15</a:t>
+              <a:t>12/6/2015</a:t>
             </a:fld>
             <a:endParaRPr lang="en-US" dirty="0"/>
           </a:p>
@@ -1918,7 +1918,7 @@
             <a:fld id="{2E6CE7CD-F68D-CB4F-B04D-F08E5924DCF3}" type="datetime1">
               <a:rPr lang="en-US" smtClean="0"/>
               <a:pPr/>
-              <a:t>12/6/15</a:t>
+              <a:t>12/6/2015</a:t>
             </a:fld>
             <a:endParaRPr lang="en-US" dirty="0"/>
           </a:p>
@@ -2261,7 +2261,7 @@
             <a:fld id="{2E6CE7CD-F68D-CB4F-B04D-F08E5924DCF3}" type="datetime1">
               <a:rPr lang="en-US" smtClean="0"/>
               <a:pPr/>
-              <a:t>12/6/15</a:t>
+              <a:t>12/6/2015</a:t>
             </a:fld>
             <a:endParaRPr lang="en-US" dirty="0"/>
           </a:p>
@@ -2591,7 +2591,7 @@
             <a:fld id="{2E6CE7CD-F68D-CB4F-B04D-F08E5924DCF3}" type="datetime1">
               <a:rPr lang="en-US" smtClean="0"/>
               <a:pPr/>
-              <a:t>12/6/15</a:t>
+              <a:t>12/6/2015</a:t>
             </a:fld>
             <a:endParaRPr lang="en-US" dirty="0"/>
           </a:p>
@@ -2894,7 +2894,7 @@
             <a:fld id="{2E6CE7CD-F68D-CB4F-B04D-F08E5924DCF3}" type="datetime1">
               <a:rPr lang="en-US" smtClean="0"/>
               <a:pPr/>
-              <a:t>12/6/15</a:t>
+              <a:t>12/6/2015</a:t>
             </a:fld>
             <a:endParaRPr lang="en-US" dirty="0"/>
           </a:p>
@@ -3286,7 +3286,7 @@
             <a:fld id="{2E6CE7CD-F68D-CB4F-B04D-F08E5924DCF3}" type="datetime1">
               <a:rPr lang="en-US" smtClean="0"/>
               <a:pPr/>
-              <a:t>12/6/15</a:t>
+              <a:t>12/6/2015</a:t>
             </a:fld>
             <a:endParaRPr lang="en-US" dirty="0"/>
           </a:p>
@@ -3711,7 +3711,7 @@
             <a:fld id="{2E6CE7CD-F68D-CB4F-B04D-F08E5924DCF3}" type="datetime1">
               <a:rPr lang="en-US" smtClean="0"/>
               <a:pPr/>
-              <a:t>12/6/15</a:t>
+              <a:t>12/6/2015</a:t>
             </a:fld>
             <a:endParaRPr lang="en-US" dirty="0"/>
           </a:p>
@@ -4264,7 +4264,7 @@
             <a:fld id="{2E6CE7CD-F68D-CB4F-B04D-F08E5924DCF3}" type="datetime1">
               <a:rPr lang="en-US" smtClean="0"/>
               <a:pPr/>
-              <a:t>12/6/15</a:t>
+              <a:t>12/6/2015</a:t>
             </a:fld>
             <a:endParaRPr lang="en-US" dirty="0"/>
           </a:p>
@@ -4627,7 +4627,7 @@
             <a:fld id="{2E6CE7CD-F68D-CB4F-B04D-F08E5924DCF3}" type="datetime1">
               <a:rPr lang="en-US" smtClean="0"/>
               <a:pPr/>
-              <a:t>12/6/15</a:t>
+              <a:t>12/6/2015</a:t>
             </a:fld>
             <a:endParaRPr lang="en-US" dirty="0"/>
           </a:p>
@@ -4847,7 +4847,7 @@
             <a:fld id="{2E6CE7CD-F68D-CB4F-B04D-F08E5924DCF3}" type="datetime1">
               <a:rPr lang="en-US" smtClean="0"/>
               <a:pPr/>
-              <a:t>12/6/15</a:t>
+              <a:t>12/6/2015</a:t>
             </a:fld>
             <a:endParaRPr lang="en-US" dirty="0"/>
           </a:p>
@@ -5159,7 +5159,7 @@
             <a:fld id="{2E6CE7CD-F68D-CB4F-B04D-F08E5924DCF3}" type="datetime1">
               <a:rPr lang="en-US" smtClean="0"/>
               <a:pPr/>
-              <a:t>12/6/15</a:t>
+              <a:t>12/6/2015</a:t>
             </a:fld>
             <a:endParaRPr lang="en-US" dirty="0"/>
           </a:p>
@@ -5420,7 +5420,7 @@
             <a:fld id="{2E6CE7CD-F68D-CB4F-B04D-F08E5924DCF3}" type="datetime1">
               <a:rPr lang="en-US" smtClean="0"/>
               <a:pPr/>
-              <a:t>12/6/15</a:t>
+              <a:t>12/6/2015</a:t>
             </a:fld>
             <a:endParaRPr lang="en-US" dirty="0"/>
           </a:p>
@@ -6177,7 +6177,7 @@
             <a:fld id="{2E6CE7CD-F68D-CB4F-B04D-F08E5924DCF3}" type="datetime1">
               <a:rPr lang="en-US" smtClean="0"/>
               <a:pPr/>
-              <a:t>12/6/15</a:t>
+              <a:t>12/6/2015</a:t>
             </a:fld>
             <a:endParaRPr lang="en-US" dirty="0"/>
           </a:p>
@@ -6651,7 +6651,7 @@
             <a:fld id="{2E6CE7CD-F68D-CB4F-B04D-F08E5924DCF3}" type="datetime1">
               <a:rPr lang="en-US" smtClean="0"/>
               <a:pPr/>
-              <a:t>12/6/15</a:t>
+              <a:t>12/6/2015</a:t>
             </a:fld>
             <a:endParaRPr lang="en-US" dirty="0"/>
           </a:p>
@@ -7029,7 +7029,7 @@
             <a:fld id="{2E6CE7CD-F68D-CB4F-B04D-F08E5924DCF3}" type="datetime1">
               <a:rPr lang="en-US" smtClean="0"/>
               <a:pPr/>
-              <a:t>12/6/15</a:t>
+              <a:t>12/6/2015</a:t>
             </a:fld>
             <a:endParaRPr lang="en-US" dirty="0"/>
           </a:p>
@@ -7433,7 +7433,7 @@
             <a:fld id="{2E6CE7CD-F68D-CB4F-B04D-F08E5924DCF3}" type="datetime1">
               <a:rPr lang="en-US" smtClean="0"/>
               <a:pPr/>
-              <a:t>12/6/15</a:t>
+              <a:t>12/6/2015</a:t>
             </a:fld>
             <a:endParaRPr lang="en-US" dirty="0"/>
           </a:p>
@@ -7858,7 +7858,7 @@
             <a:fld id="{2E6CE7CD-F68D-CB4F-B04D-F08E5924DCF3}" type="datetime1">
               <a:rPr lang="en-US" smtClean="0"/>
               <a:pPr/>
-              <a:t>12/6/15</a:t>
+              <a:t>12/6/2015</a:t>
             </a:fld>
             <a:endParaRPr lang="en-US" dirty="0"/>
           </a:p>
@@ -8246,7 +8246,7 @@
             <a:fld id="{2E6CE7CD-F68D-CB4F-B04D-F08E5924DCF3}" type="datetime1">
               <a:rPr lang="en-US" smtClean="0"/>
               <a:pPr/>
-              <a:t>12/6/15</a:t>
+              <a:t>12/6/2015</a:t>
             </a:fld>
             <a:endParaRPr lang="en-US" dirty="0"/>
           </a:p>
@@ -8744,22 +8744,33 @@
           <a:bodyPr lIns="376202" tIns="188101" rIns="376202" bIns="188101" rtlCol="0" anchor="t"/>
           <a:lstStyle/>
           <a:p>
-            <a:r>
-              <a:rPr lang="en-US" sz="7000" b="1" u="sng" dirty="0" smtClean="0"/>
+            <a:pPr algn="ctr"/>
+            <a:r>
+              <a:rPr lang="en-US" sz="7000" dirty="0" smtClean="0"/>
               <a:t>Goal</a:t>
             </a:r>
-            <a:r>
-              <a:rPr lang="en-US" sz="4000" b="1" u="sng" dirty="0" smtClean="0"/>
-              <a:t> </a:t>
-            </a:r>
+          </a:p>
+          <a:p>
             <a:r>
               <a:rPr lang="en-US" sz="4000" dirty="0" smtClean="0"/>
-              <a:t>: From FMRI image predict out of two words which one was shown to the subject</a:t>
-            </a:r>
-          </a:p>
-          <a:p>
-            <a:r>
-              <a:rPr lang="en-US" sz="7000" b="1" dirty="0" smtClean="0"/>
+              <a:t> From an </a:t>
+            </a:r>
+            <a:r>
+              <a:rPr lang="en-US" sz="4000" dirty="0" smtClean="0"/>
+              <a:t>FMRI image predict </a:t>
+            </a:r>
+            <a:r>
+              <a:rPr lang="en-US" sz="4000" dirty="0" smtClean="0"/>
+              <a:t>which word which was shown to the subject</a:t>
+            </a:r>
+          </a:p>
+          <a:p>
+            <a:endParaRPr lang="en-US" sz="4000" dirty="0" smtClean="0"/>
+          </a:p>
+          <a:p>
+            <a:pPr algn="ctr"/>
+            <a:r>
+              <a:rPr lang="en-US" sz="7000" dirty="0" smtClean="0"/>
               <a:t>Data </a:t>
             </a:r>
           </a:p>
@@ -8780,7 +8791,15 @@
             </a:r>
             <a:r>
               <a:rPr lang="en-US" sz="4000" dirty="0" smtClean="0"/>
-              <a:t>. flies? animal?</a:t>
+              <a:t>. </a:t>
+            </a:r>
+            <a:r>
+              <a:rPr lang="en-US" sz="4000" dirty="0" smtClean="0"/>
+              <a:t>Does it fly? Is it an animal</a:t>
+            </a:r>
+            <a:r>
+              <a:rPr lang="en-US" sz="4000" dirty="0" smtClean="0"/>
+              <a:t>?</a:t>
             </a:r>
           </a:p>
           <a:p>
@@ -8801,58 +8820,82 @@
             </a:r>
           </a:p>
           <a:p>
-            <a:pPr algn="ctr"/>
-            <a:endParaRPr lang="en-US" sz="7000" dirty="0" smtClean="0"/>
-          </a:p>
-          <a:p>
+            <a:endParaRPr lang="en-US" sz="4000" dirty="0" smtClean="0"/>
+          </a:p>
+          <a:p>
+            <a:pPr marL="571500" indent="-571500">
+              <a:buFont typeface="Arial"/>
+              <a:buChar char="•"/>
+            </a:pPr>
             <a:r>
               <a:rPr lang="en-US" sz="4000" dirty="0" smtClean="0"/>
-              <a:t>Find weights that predict each semantic feature (y) from </a:t>
-            </a:r>
-            <a:r>
-              <a:rPr lang="en-US" sz="4000" dirty="0" err="1" smtClean="0"/>
-              <a:t>fmri</a:t>
-            </a:r>
+              <a:t>Train different ML models on 300 fMRI’s</a:t>
+            </a:r>
+          </a:p>
+          <a:p>
+            <a:pPr marL="571500" indent="-571500">
+              <a:buFont typeface="Arial"/>
+              <a:buChar char="•"/>
+            </a:pPr>
             <a:r>
               <a:rPr lang="en-US" sz="4000" dirty="0" smtClean="0"/>
-              <a:t> images (x) :</a:t>
-            </a:r>
-          </a:p>
-          <a:p>
-            <a:pPr marL="514350" indent="-514350">
-              <a:buAutoNum type="arabicParenR"/>
+              <a:t>Predict </a:t>
+            </a:r>
+            <a:r>
+              <a:rPr lang="en-US" sz="4000" dirty="0"/>
+              <a:t>semantic features </a:t>
+            </a:r>
+            <a:r>
+              <a:rPr lang="en-US" sz="4000" dirty="0" smtClean="0"/>
+              <a:t>ratings from fMRI image. </a:t>
+            </a:r>
+            <a:endParaRPr lang="en-US" sz="4000" dirty="0"/>
+          </a:p>
+          <a:p>
+            <a:pPr marL="571500" indent="-571500">
+              <a:buFont typeface="Arial"/>
+              <a:buChar char="•"/>
             </a:pPr>
             <a:r>
+              <a:rPr lang="en-US" sz="4000" dirty="0"/>
+              <a:t>Calculate </a:t>
+            </a:r>
+            <a:r>
               <a:rPr lang="en-US" sz="4000" dirty="0" smtClean="0"/>
-              <a:t>Lasso – 0.5 accuracy with different ways of choosing lambdas</a:t>
-            </a:r>
-          </a:p>
-          <a:p>
-            <a:pPr marL="514350" indent="-514350">
-              <a:buAutoNum type="arabicParenR"/>
+              <a:t>distance to prediction </a:t>
+            </a:r>
+            <a:r>
+              <a:rPr lang="en-US" sz="4000" dirty="0"/>
+              <a:t>from </a:t>
+            </a:r>
+            <a:r>
+              <a:rPr lang="en-US" sz="4000" dirty="0" smtClean="0"/>
+              <a:t>features of two </a:t>
+            </a:r>
+            <a:r>
+              <a:rPr lang="en-US" sz="4000" dirty="0"/>
+              <a:t>given </a:t>
+            </a:r>
+            <a:r>
+              <a:rPr lang="en-US" sz="4000" dirty="0" smtClean="0"/>
+              <a:t>words</a:t>
+            </a:r>
+            <a:endParaRPr lang="en-US" sz="4000" dirty="0"/>
+          </a:p>
+          <a:p>
+            <a:pPr marL="571500" indent="-571500">
+              <a:buFont typeface="Arial"/>
+              <a:buChar char="•"/>
             </a:pPr>
             <a:r>
+              <a:rPr lang="en-US" sz="4000" dirty="0"/>
+              <a:t>Choose word </a:t>
+            </a:r>
+            <a:r>
               <a:rPr lang="en-US" sz="4000" dirty="0" smtClean="0"/>
-              <a:t>PCA and </a:t>
-            </a:r>
-            <a:r>
-              <a:rPr lang="en-US" sz="4000" dirty="0" err="1" smtClean="0"/>
-              <a:t>Lasoo</a:t>
-            </a:r>
-            <a:r>
-              <a:rPr lang="en-US" sz="4000" dirty="0" smtClean="0"/>
-              <a:t>  - 0.7 accuracy</a:t>
-            </a:r>
-            <a:endParaRPr lang="en-US" sz="4000" dirty="0"/>
-          </a:p>
-          <a:p>
-            <a:pPr marL="514350" indent="-514350">
-              <a:buAutoNum type="arabicParenR"/>
-            </a:pPr>
-            <a:r>
-              <a:rPr lang="en-US" sz="4000" u="sng" dirty="0" smtClean="0"/>
-              <a:t>PCA and Least Squares – 0.8 accuracy</a:t>
-            </a:r>
+              <a:t>with smallest distance</a:t>
+            </a:r>
+            <a:endParaRPr lang="en-US" sz="4000" dirty="0" smtClean="0"/>
           </a:p>
           <a:p>
             <a:pPr marL="1143000" indent="-1143000" algn="ctr">
@@ -8865,50 +8908,82 @@
             <a:pPr algn="ctr"/>
             <a:r>
               <a:rPr lang="en-US" sz="7000" dirty="0" smtClean="0"/>
-              <a:t>Results : Accuracy</a:t>
+              <a:t>Results: </a:t>
+            </a:r>
+            <a:r>
+              <a:rPr lang="en-US" sz="7000" dirty="0" smtClean="0"/>
+              <a:t>Accuracy</a:t>
             </a:r>
           </a:p>
           <a:p>
             <a:pPr algn="ctr"/>
-            <a:endParaRPr lang="en-US" sz="7000" dirty="0"/>
+            <a:endParaRPr lang="en-US" sz="4000" dirty="0"/>
+          </a:p>
+          <a:p>
+            <a:pPr marL="514350" indent="-514350">
+              <a:buAutoNum type="arabicParenR"/>
+            </a:pPr>
+            <a:r>
+              <a:rPr lang="en-US" sz="4000" dirty="0" smtClean="0"/>
+              <a:t>Lasso </a:t>
+            </a:r>
+            <a:r>
+              <a:rPr lang="en-US" sz="4000" dirty="0"/>
+              <a:t>– 50% accuracy </a:t>
+            </a:r>
+            <a:r>
+              <a:rPr lang="en-US" sz="4000" dirty="0" smtClean="0"/>
+              <a:t>regardless of how regularization chosen</a:t>
+            </a:r>
+          </a:p>
+          <a:p>
+            <a:pPr marL="514350" indent="-514350">
+              <a:buAutoNum type="arabicParenR"/>
+            </a:pPr>
+            <a:r>
+              <a:rPr lang="en-US" sz="4000" dirty="0" smtClean="0"/>
+              <a:t>PCA </a:t>
+            </a:r>
+            <a:r>
+              <a:rPr lang="en-US" sz="4000" dirty="0"/>
+              <a:t>and Lasso  - 70% accuracy</a:t>
+            </a:r>
+          </a:p>
+          <a:p>
+            <a:pPr marL="514350" indent="-514350">
+              <a:buAutoNum type="arabicParenR"/>
+            </a:pPr>
+            <a:r>
+              <a:rPr lang="en-US" sz="4000" dirty="0"/>
+              <a:t>PCA and Least Squares – 80% </a:t>
+            </a:r>
+            <a:r>
+              <a:rPr lang="en-US" sz="4000" dirty="0" smtClean="0"/>
+              <a:t>accuracy</a:t>
+            </a:r>
+          </a:p>
+          <a:p>
+            <a:pPr marL="571500" indent="-571500">
+              <a:buFont typeface="Arial" panose="020B0604020202020204" pitchFamily="34" charset="0"/>
+              <a:buChar char="•"/>
+            </a:pPr>
+            <a:r>
+              <a:rPr lang="en-US" sz="4000" dirty="0" smtClean="0"/>
+              <a:t>Same predictive power as ML model from research paper.</a:t>
+            </a:r>
+          </a:p>
+          <a:p>
+            <a:r>
+              <a:rPr lang="en-US" sz="4000" dirty="0" smtClean="0"/>
+              <a:t>    (Random cosines)</a:t>
+            </a:r>
+            <a:endParaRPr lang="en-US" sz="4000" dirty="0"/>
           </a:p>
           <a:p>
             <a:pPr marL="571500" indent="-571500">
               <a:buFont typeface="Arial"/>
               <a:buChar char="•"/>
             </a:pPr>
-            <a:r>
-              <a:rPr lang="en-US" sz="4000" dirty="0" smtClean="0"/>
-              <a:t>Predict semantic features from </a:t>
-            </a:r>
-            <a:r>
-              <a:rPr lang="en-US" sz="4000" dirty="0" err="1" smtClean="0"/>
-              <a:t>fmri</a:t>
-            </a:r>
-            <a:r>
-              <a:rPr lang="en-US" sz="4000" dirty="0" smtClean="0"/>
-              <a:t> image</a:t>
-            </a:r>
-          </a:p>
-          <a:p>
-            <a:pPr marL="571500" indent="-571500">
-              <a:buFont typeface="Arial"/>
-              <a:buChar char="•"/>
-            </a:pPr>
-            <a:r>
-              <a:rPr lang="en-US" sz="4000" dirty="0" smtClean="0"/>
-              <a:t>Calculate distance from two given words</a:t>
-            </a:r>
-          </a:p>
-          <a:p>
-            <a:pPr marL="571500" indent="-571500">
-              <a:buFont typeface="Arial"/>
-              <a:buChar char="•"/>
-            </a:pPr>
-            <a:r>
-              <a:rPr lang="en-US" sz="4000" dirty="0" smtClean="0"/>
-              <a:t>Choose word with least distance</a:t>
-            </a:r>
             <a:endParaRPr lang="en-US" sz="4000" dirty="0"/>
           </a:p>
           <a:p>
@@ -8935,8 +9010,8 @@
         </p:nvSpPr>
         <p:spPr>
           <a:xfrm>
-            <a:off x="2438400" y="838201"/>
-            <a:ext cx="30784800" cy="2819400"/>
+            <a:off x="1371600" y="838201"/>
+            <a:ext cx="33451800" cy="2819400"/>
           </a:xfrm>
           <a:prstGeom prst="rect">
             <a:avLst/>
@@ -9219,9 +9294,37 @@
             <a:pPr algn="ctr"/>
             <a:r>
               <a:rPr lang="en-US" dirty="0" smtClean="0"/>
-              <a:t>PCA dimensions</a:t>
-            </a:r>
-            <a:endParaRPr dirty="0"/>
+              <a:t>PCA </a:t>
+            </a:r>
+            <a:r>
+              <a:rPr lang="en-US" dirty="0" smtClean="0"/>
+              <a:t>dimensions</a:t>
+            </a:r>
+          </a:p>
+          <a:p>
+            <a:pPr algn="ctr"/>
+            <a:endParaRPr lang="en-US" sz="4000" dirty="0" smtClean="0"/>
+          </a:p>
+          <a:p>
+            <a:pPr marL="571500" indent="-571500">
+              <a:buFont typeface="Arial" panose="020B0604020202020204" pitchFamily="34" charset="0"/>
+              <a:buChar char="•"/>
+            </a:pPr>
+            <a:r>
+              <a:rPr lang="en-US" sz="4000" dirty="0" smtClean="0"/>
+              <a:t>Accuracy increases with PCA components- not overfitting</a:t>
+            </a:r>
+          </a:p>
+          <a:p>
+            <a:pPr marL="571500" indent="-571500">
+              <a:buFont typeface="Arial" panose="020B0604020202020204" pitchFamily="34" charset="0"/>
+              <a:buChar char="•"/>
+            </a:pPr>
+            <a:r>
+              <a:rPr lang="en-US" sz="4000" dirty="0" smtClean="0"/>
+              <a:t>Compare test RMSE vs accuracy</a:t>
+            </a:r>
+            <a:endParaRPr sz="4000" dirty="0"/>
           </a:p>
         </p:txBody>
       </p:sp>
@@ -9277,16 +9380,59 @@
             <a:endParaRPr lang="en-US" sz="7000" dirty="0"/>
           </a:p>
           <a:p>
+            <a:pPr marL="571500" indent="-571500">
+              <a:buFont typeface="Arial" panose="020B0604020202020204" pitchFamily="34" charset="0"/>
+              <a:buChar char="•"/>
+            </a:pPr>
             <a:r>
               <a:rPr lang="en-US" sz="4000" dirty="0" smtClean="0"/>
+              <a:t>Rank likelihood of words according to semantic distance</a:t>
+            </a:r>
+          </a:p>
+          <a:p>
+            <a:pPr marL="571500" indent="-571500">
+              <a:buFont typeface="Arial" panose="020B0604020202020204" pitchFamily="34" charset="0"/>
+              <a:buChar char="•"/>
+            </a:pPr>
+            <a:r>
+              <a:rPr lang="en-US" sz="4000" dirty="0"/>
               <a:t>Training data set : &lt;rank&gt; = 1</a:t>
             </a:r>
           </a:p>
           <a:p>
+            <a:pPr marL="571500" indent="-571500">
+              <a:buFont typeface="Arial" panose="020B0604020202020204" pitchFamily="34" charset="0"/>
+              <a:buChar char="•"/>
+            </a:pPr>
+            <a:r>
+              <a:rPr lang="en-US" sz="4000" dirty="0"/>
+              <a:t>Test data set : &lt;rank&gt;  = </a:t>
+            </a:r>
             <a:r>
               <a:rPr lang="en-US" sz="4000" dirty="0" smtClean="0"/>
-              <a:t>Test data set : &lt;rank&gt;  = 13</a:t>
-            </a:r>
+              <a:t>13 </a:t>
+            </a:r>
+          </a:p>
+          <a:p>
+            <a:pPr marL="571500" indent="-571500">
+              <a:buFont typeface="Arial" panose="020B0604020202020204" pitchFamily="34" charset="0"/>
+              <a:buChar char="•"/>
+            </a:pPr>
+            <a:r>
+              <a:rPr lang="en-US" sz="4000" dirty="0" smtClean="0"/>
+              <a:t>Consistent with error rate on 2-word prediction</a:t>
+            </a:r>
+            <a:endParaRPr lang="en-US" sz="4000" dirty="0"/>
+          </a:p>
+          <a:p>
+            <a:pPr marL="571500" indent="-571500">
+              <a:buFont typeface="Arial" panose="020B0604020202020204" pitchFamily="34" charset="0"/>
+              <a:buChar char="•"/>
+            </a:pPr>
+            <a:endParaRPr lang="en-US" sz="4000" dirty="0" smtClean="0"/>
+          </a:p>
+          <a:p>
+            <a:endParaRPr lang="en-US" sz="4000" dirty="0" smtClean="0"/>
           </a:p>
           <a:p>
             <a:r>
@@ -9370,8 +9516,9 @@
             <a:pPr algn="ctr"/>
             <a:r>
               <a:rPr lang="en-US" dirty="0" smtClean="0"/>
-              <a:t>Wrong words – why?</a:t>
-            </a:r>
+              <a:t>Bad Words</a:t>
+            </a:r>
+            <a:endParaRPr lang="en-US" dirty="0" smtClean="0"/>
           </a:p>
           <a:p>
             <a:endParaRPr lang="en-US" sz="8000" dirty="0"/>
@@ -9529,7 +9676,7 @@
         </p:blipFill>
         <p:spPr bwMode="auto">
           <a:xfrm>
-            <a:off x="25146000" y="6096000"/>
+            <a:off x="24917400" y="8232139"/>
             <a:ext cx="4724400" cy="3662680"/>
           </a:xfrm>
           <a:prstGeom prst="rect">
@@ -9562,7 +9709,7 @@
         </p:blipFill>
         <p:spPr bwMode="auto">
           <a:xfrm>
-            <a:off x="30022800" y="8305800"/>
+            <a:off x="29794200" y="11833860"/>
             <a:ext cx="4572000" cy="3967480"/>
           </a:xfrm>
           <a:prstGeom prst="rect">
@@ -9576,7 +9723,7 @@
       </p:pic>
       <p:pic>
         <p:nvPicPr>
-          <p:cNvPr id="10" name="Picture 9" descr="Macintosh HD:Users:Stella:PycharmProjects:cse546hmw1:fmri:rmse_train_test.png"/>
+          <p:cNvPr id="11" name="Picture 10" descr="Macintosh HD:Users:Stella:Desktop:pca variance.png"/>
           <p:cNvPicPr/>
           <p:nvPr/>
         </p:nvPicPr>
@@ -9595,8 +9742,8 @@
         </p:blipFill>
         <p:spPr bwMode="auto">
           <a:xfrm>
-            <a:off x="14401800" y="18288000"/>
-            <a:ext cx="5486400" cy="4119880"/>
+            <a:off x="24917400" y="11948160"/>
+            <a:ext cx="4572000" cy="3738880"/>
           </a:xfrm>
           <a:prstGeom prst="rect">
             <a:avLst/>
@@ -9609,8 +9756,10 @@
       </p:pic>
       <p:pic>
         <p:nvPicPr>
-          <p:cNvPr id="11" name="Picture 10" descr="Macintosh HD:Users:Stella:Desktop:pca variance.png"/>
-          <p:cNvPicPr/>
+          <p:cNvPr id="12" name="Picture 11"/>
+          <p:cNvPicPr>
+            <a:picLocks noChangeAspect="1"/>
+          </p:cNvPicPr>
           <p:nvPr/>
         </p:nvPicPr>
         <p:blipFill>
@@ -9621,23 +9770,72 @@
               </a:ext>
             </a:extLst>
           </a:blip>
-          <a:srcRect/>
           <a:stretch>
             <a:fillRect/>
           </a:stretch>
         </p:blipFill>
-        <p:spPr bwMode="auto">
-          <a:xfrm>
-            <a:off x="25222200" y="11506200"/>
-            <a:ext cx="4572000" cy="3738880"/>
+        <p:spPr>
+          <a:xfrm>
+            <a:off x="15430492" y="20421600"/>
+            <a:ext cx="7315215" cy="5486411"/>
           </a:xfrm>
           <a:prstGeom prst="rect">
             <a:avLst/>
           </a:prstGeom>
-          <a:noFill/>
-          <a:ln>
-            <a:noFill/>
-          </a:ln>
+        </p:spPr>
+      </p:pic>
+      <p:pic>
+        <p:nvPicPr>
+          <p:cNvPr id="13" name="Picture 12"/>
+          <p:cNvPicPr>
+            <a:picLocks noChangeAspect="1"/>
+          </p:cNvPicPr>
+          <p:nvPr/>
+        </p:nvPicPr>
+        <p:blipFill>
+          <a:blip r:embed="rId6">
+            <a:extLst>
+              <a:ext uri="{28A0092B-C50C-407E-A947-70E740481C1C}">
+                <a14:useLocalDpi xmlns:a14="http://schemas.microsoft.com/office/drawing/2010/main" val="0"/>
+              </a:ext>
+            </a:extLst>
+          </a:blip>
+          <a:stretch>
+            <a:fillRect/>
+          </a:stretch>
+        </p:blipFill>
+        <p:spPr>
+          <a:xfrm>
+            <a:off x="29794200" y="8229409"/>
+            <a:ext cx="4815840" cy="3581781"/>
+          </a:xfrm>
+          <a:prstGeom prst="rect">
+            <a:avLst/>
+          </a:prstGeom>
+        </p:spPr>
+      </p:pic>
+      <p:pic>
+        <p:nvPicPr>
+          <p:cNvPr id="14" name="Picture 13"/>
+          <p:cNvPicPr>
+            <a:picLocks noChangeAspect="1"/>
+          </p:cNvPicPr>
+          <p:nvPr/>
+        </p:nvPicPr>
+        <p:blipFill>
+          <a:blip r:embed="rId7"/>
+          <a:stretch>
+            <a:fillRect/>
+          </a:stretch>
+        </p:blipFill>
+        <p:spPr>
+          <a:xfrm>
+            <a:off x="7848600" y="23619666"/>
+            <a:ext cx="3352800" cy="4056185"/>
+          </a:xfrm>
+          <a:prstGeom prst="rect">
+            <a:avLst/>
+          </a:prstGeom>
         </p:spPr>
       </p:pic>
     </p:spTree>
@@ -9653,7 +9851,7 @@
   <p:timing>
     <p:tnLst>
       <p:par>
-        <p:cTn xmlns:p14="http://schemas.microsoft.com/office/powerpoint/2010/main" id="1" dur="indefinite" restart="never" nodeType="tmRoot"/>
+        <p:cTn id="1" dur="indefinite" restart="never" nodeType="tmRoot"/>
       </p:par>
     </p:tnLst>
   </p:timing>

</xml_diff>